<commit_message>
First part of fixes
</commit_message>
<xml_diff>
--- a/task7.pptx
+++ b/task7.pptx
@@ -14,8 +14,7 @@
     <p:sldId id="262" r:id="rId8"/>
     <p:sldId id="263" r:id="rId9"/>
     <p:sldId id="264" r:id="rId10"/>
-    <p:sldId id="265" r:id="rId11"/>
-    <p:sldId id="266" r:id="rId12"/>
+    <p:sldId id="266" r:id="rId11"/>
   </p:sldIdLst>
   <p:sldSz cx="12192000" cy="6858000"/>
   <p:notesSz cx="6858000" cy="9144000"/>
@@ -114,6 +113,11 @@
       </a:defRPr>
     </a:lvl9pPr>
   </p:defaultTextStyle>
+  <p:extLst>
+    <p:ext uri="{EFAFB233-063F-42B5-8137-9DF3F51BA10A}">
+      <p15:sldGuideLst xmlns:p15="http://schemas.microsoft.com/office/powerpoint/2012/main"/>
+    </p:ext>
+  </p:extLst>
 </p:presentation>
 </file>
 
@@ -159,10 +163,9 @@
           </a:lstStyle>
           <a:p>
             <a:r>
-              <a:rPr lang="ru-RU" smtClean="0"/>
+              <a:rPr lang="ru-RU"/>
               <a:t>Образец заголовка</a:t>
             </a:r>
-            <a:endParaRPr lang="ru-RU"/>
           </a:p>
         </p:txBody>
       </p:sp>
@@ -224,10 +227,9 @@
           </a:lstStyle>
           <a:p>
             <a:r>
-              <a:rPr lang="ru-RU" smtClean="0"/>
+              <a:rPr lang="ru-RU"/>
               <a:t>Образец подзаголовка</a:t>
             </a:r>
-            <a:endParaRPr lang="ru-RU"/>
           </a:p>
         </p:txBody>
       </p:sp>
@@ -248,7 +250,7 @@
           <a:p>
             <a:fld id="{CB8AB8CA-94B0-4D70-B3AA-F4F604145185}" type="datetimeFigureOut">
               <a:rPr lang="ru-RU" smtClean="0"/>
-              <a:t>21.12.2020</a:t>
+              <a:t>22.12.2020</a:t>
             </a:fld>
             <a:endParaRPr lang="ru-RU"/>
           </a:p>
@@ -342,10 +344,9 @@
           <a:lstStyle/>
           <a:p>
             <a:r>
-              <a:rPr lang="ru-RU" smtClean="0"/>
+              <a:rPr lang="ru-RU"/>
               <a:t>Образец заголовка</a:t>
             </a:r>
-            <a:endParaRPr lang="ru-RU"/>
           </a:p>
         </p:txBody>
       </p:sp>
@@ -366,38 +367,37 @@
           <a:p>
             <a:pPr lvl="0"/>
             <a:r>
-              <a:rPr lang="ru-RU" smtClean="0"/>
+              <a:rPr lang="ru-RU"/>
               <a:t>Образец текста</a:t>
             </a:r>
           </a:p>
           <a:p>
             <a:pPr lvl="1"/>
             <a:r>
-              <a:rPr lang="ru-RU" smtClean="0"/>
+              <a:rPr lang="ru-RU"/>
               <a:t>Второй уровень</a:t>
             </a:r>
           </a:p>
           <a:p>
             <a:pPr lvl="2"/>
             <a:r>
-              <a:rPr lang="ru-RU" smtClean="0"/>
+              <a:rPr lang="ru-RU"/>
               <a:t>Третий уровень</a:t>
             </a:r>
           </a:p>
           <a:p>
             <a:pPr lvl="3"/>
             <a:r>
-              <a:rPr lang="ru-RU" smtClean="0"/>
+              <a:rPr lang="ru-RU"/>
               <a:t>Четвертый уровень</a:t>
             </a:r>
           </a:p>
           <a:p>
             <a:pPr lvl="4"/>
             <a:r>
-              <a:rPr lang="ru-RU" smtClean="0"/>
+              <a:rPr lang="ru-RU"/>
               <a:t>Пятый уровень</a:t>
             </a:r>
-            <a:endParaRPr lang="ru-RU"/>
           </a:p>
         </p:txBody>
       </p:sp>
@@ -418,7 +418,7 @@
           <a:p>
             <a:fld id="{CB8AB8CA-94B0-4D70-B3AA-F4F604145185}" type="datetimeFigureOut">
               <a:rPr lang="ru-RU" smtClean="0"/>
-              <a:t>21.12.2020</a:t>
+              <a:t>22.12.2020</a:t>
             </a:fld>
             <a:endParaRPr lang="ru-RU"/>
           </a:p>
@@ -517,10 +517,9 @@
           <a:lstStyle/>
           <a:p>
             <a:r>
-              <a:rPr lang="ru-RU" smtClean="0"/>
+              <a:rPr lang="ru-RU"/>
               <a:t>Образец заголовка</a:t>
             </a:r>
-            <a:endParaRPr lang="ru-RU"/>
           </a:p>
         </p:txBody>
       </p:sp>
@@ -546,38 +545,37 @@
           <a:p>
             <a:pPr lvl="0"/>
             <a:r>
-              <a:rPr lang="ru-RU" smtClean="0"/>
+              <a:rPr lang="ru-RU"/>
               <a:t>Образец текста</a:t>
             </a:r>
           </a:p>
           <a:p>
             <a:pPr lvl="1"/>
             <a:r>
-              <a:rPr lang="ru-RU" smtClean="0"/>
+              <a:rPr lang="ru-RU"/>
               <a:t>Второй уровень</a:t>
             </a:r>
           </a:p>
           <a:p>
             <a:pPr lvl="2"/>
             <a:r>
-              <a:rPr lang="ru-RU" smtClean="0"/>
+              <a:rPr lang="ru-RU"/>
               <a:t>Третий уровень</a:t>
             </a:r>
           </a:p>
           <a:p>
             <a:pPr lvl="3"/>
             <a:r>
-              <a:rPr lang="ru-RU" smtClean="0"/>
+              <a:rPr lang="ru-RU"/>
               <a:t>Четвертый уровень</a:t>
             </a:r>
           </a:p>
           <a:p>
             <a:pPr lvl="4"/>
             <a:r>
-              <a:rPr lang="ru-RU" smtClean="0"/>
+              <a:rPr lang="ru-RU"/>
               <a:t>Пятый уровень</a:t>
             </a:r>
-            <a:endParaRPr lang="ru-RU"/>
           </a:p>
         </p:txBody>
       </p:sp>
@@ -598,7 +596,7 @@
           <a:p>
             <a:fld id="{CB8AB8CA-94B0-4D70-B3AA-F4F604145185}" type="datetimeFigureOut">
               <a:rPr lang="ru-RU" smtClean="0"/>
-              <a:t>21.12.2020</a:t>
+              <a:t>22.12.2020</a:t>
             </a:fld>
             <a:endParaRPr lang="ru-RU"/>
           </a:p>
@@ -692,10 +690,9 @@
           <a:lstStyle/>
           <a:p>
             <a:r>
-              <a:rPr lang="ru-RU" smtClean="0"/>
+              <a:rPr lang="ru-RU"/>
               <a:t>Образец заголовка</a:t>
             </a:r>
-            <a:endParaRPr lang="ru-RU"/>
           </a:p>
         </p:txBody>
       </p:sp>
@@ -716,38 +713,37 @@
           <a:p>
             <a:pPr lvl="0"/>
             <a:r>
-              <a:rPr lang="ru-RU" smtClean="0"/>
+              <a:rPr lang="ru-RU"/>
               <a:t>Образец текста</a:t>
             </a:r>
           </a:p>
           <a:p>
             <a:pPr lvl="1"/>
             <a:r>
-              <a:rPr lang="ru-RU" smtClean="0"/>
+              <a:rPr lang="ru-RU"/>
               <a:t>Второй уровень</a:t>
             </a:r>
           </a:p>
           <a:p>
             <a:pPr lvl="2"/>
             <a:r>
-              <a:rPr lang="ru-RU" smtClean="0"/>
+              <a:rPr lang="ru-RU"/>
               <a:t>Третий уровень</a:t>
             </a:r>
           </a:p>
           <a:p>
             <a:pPr lvl="3"/>
             <a:r>
-              <a:rPr lang="ru-RU" smtClean="0"/>
+              <a:rPr lang="ru-RU"/>
               <a:t>Четвертый уровень</a:t>
             </a:r>
           </a:p>
           <a:p>
             <a:pPr lvl="4"/>
             <a:r>
-              <a:rPr lang="ru-RU" smtClean="0"/>
+              <a:rPr lang="ru-RU"/>
               <a:t>Пятый уровень</a:t>
             </a:r>
-            <a:endParaRPr lang="ru-RU"/>
           </a:p>
         </p:txBody>
       </p:sp>
@@ -768,7 +764,7 @@
           <a:p>
             <a:fld id="{CB8AB8CA-94B0-4D70-B3AA-F4F604145185}" type="datetimeFigureOut">
               <a:rPr lang="ru-RU" smtClean="0"/>
-              <a:t>21.12.2020</a:t>
+              <a:t>22.12.2020</a:t>
             </a:fld>
             <a:endParaRPr lang="ru-RU"/>
           </a:p>
@@ -871,10 +867,9 @@
           </a:lstStyle>
           <a:p>
             <a:r>
-              <a:rPr lang="ru-RU" smtClean="0"/>
+              <a:rPr lang="ru-RU"/>
               <a:t>Образец заголовка</a:t>
             </a:r>
-            <a:endParaRPr lang="ru-RU"/>
           </a:p>
         </p:txBody>
       </p:sp>
@@ -991,7 +986,7 @@
           <a:p>
             <a:pPr lvl="0"/>
             <a:r>
-              <a:rPr lang="ru-RU" smtClean="0"/>
+              <a:rPr lang="ru-RU"/>
               <a:t>Образец текста</a:t>
             </a:r>
           </a:p>
@@ -1014,7 +1009,7 @@
           <a:p>
             <a:fld id="{CB8AB8CA-94B0-4D70-B3AA-F4F604145185}" type="datetimeFigureOut">
               <a:rPr lang="ru-RU" smtClean="0"/>
-              <a:t>21.12.2020</a:t>
+              <a:t>22.12.2020</a:t>
             </a:fld>
             <a:endParaRPr lang="ru-RU"/>
           </a:p>
@@ -1108,10 +1103,9 @@
           <a:lstStyle/>
           <a:p>
             <a:r>
-              <a:rPr lang="ru-RU" smtClean="0"/>
+              <a:rPr lang="ru-RU"/>
               <a:t>Образец заголовка</a:t>
             </a:r>
-            <a:endParaRPr lang="ru-RU"/>
           </a:p>
         </p:txBody>
       </p:sp>
@@ -1137,38 +1131,37 @@
           <a:p>
             <a:pPr lvl="0"/>
             <a:r>
-              <a:rPr lang="ru-RU" smtClean="0"/>
+              <a:rPr lang="ru-RU"/>
               <a:t>Образец текста</a:t>
             </a:r>
           </a:p>
           <a:p>
             <a:pPr lvl="1"/>
             <a:r>
-              <a:rPr lang="ru-RU" smtClean="0"/>
+              <a:rPr lang="ru-RU"/>
               <a:t>Второй уровень</a:t>
             </a:r>
           </a:p>
           <a:p>
             <a:pPr lvl="2"/>
             <a:r>
-              <a:rPr lang="ru-RU" smtClean="0"/>
+              <a:rPr lang="ru-RU"/>
               <a:t>Третий уровень</a:t>
             </a:r>
           </a:p>
           <a:p>
             <a:pPr lvl="3"/>
             <a:r>
-              <a:rPr lang="ru-RU" smtClean="0"/>
+              <a:rPr lang="ru-RU"/>
               <a:t>Четвертый уровень</a:t>
             </a:r>
           </a:p>
           <a:p>
             <a:pPr lvl="4"/>
             <a:r>
-              <a:rPr lang="ru-RU" smtClean="0"/>
+              <a:rPr lang="ru-RU"/>
               <a:t>Пятый уровень</a:t>
             </a:r>
-            <a:endParaRPr lang="ru-RU"/>
           </a:p>
         </p:txBody>
       </p:sp>
@@ -1194,38 +1187,37 @@
           <a:p>
             <a:pPr lvl="0"/>
             <a:r>
-              <a:rPr lang="ru-RU" smtClean="0"/>
+              <a:rPr lang="ru-RU"/>
               <a:t>Образец текста</a:t>
             </a:r>
           </a:p>
           <a:p>
             <a:pPr lvl="1"/>
             <a:r>
-              <a:rPr lang="ru-RU" smtClean="0"/>
+              <a:rPr lang="ru-RU"/>
               <a:t>Второй уровень</a:t>
             </a:r>
           </a:p>
           <a:p>
             <a:pPr lvl="2"/>
             <a:r>
-              <a:rPr lang="ru-RU" smtClean="0"/>
+              <a:rPr lang="ru-RU"/>
               <a:t>Третий уровень</a:t>
             </a:r>
           </a:p>
           <a:p>
             <a:pPr lvl="3"/>
             <a:r>
-              <a:rPr lang="ru-RU" smtClean="0"/>
+              <a:rPr lang="ru-RU"/>
               <a:t>Четвертый уровень</a:t>
             </a:r>
           </a:p>
           <a:p>
             <a:pPr lvl="4"/>
             <a:r>
-              <a:rPr lang="ru-RU" smtClean="0"/>
+              <a:rPr lang="ru-RU"/>
               <a:t>Пятый уровень</a:t>
             </a:r>
-            <a:endParaRPr lang="ru-RU"/>
           </a:p>
         </p:txBody>
       </p:sp>
@@ -1246,7 +1238,7 @@
           <a:p>
             <a:fld id="{CB8AB8CA-94B0-4D70-B3AA-F4F604145185}" type="datetimeFigureOut">
               <a:rPr lang="ru-RU" smtClean="0"/>
-              <a:t>21.12.2020</a:t>
+              <a:t>22.12.2020</a:t>
             </a:fld>
             <a:endParaRPr lang="ru-RU"/>
           </a:p>
@@ -1345,10 +1337,9 @@
           <a:lstStyle/>
           <a:p>
             <a:r>
-              <a:rPr lang="ru-RU" smtClean="0"/>
+              <a:rPr lang="ru-RU"/>
               <a:t>Образец заголовка</a:t>
             </a:r>
-            <a:endParaRPr lang="ru-RU"/>
           </a:p>
         </p:txBody>
       </p:sp>
@@ -1411,7 +1402,7 @@
           <a:p>
             <a:pPr lvl="0"/>
             <a:r>
-              <a:rPr lang="ru-RU" smtClean="0"/>
+              <a:rPr lang="ru-RU"/>
               <a:t>Образец текста</a:t>
             </a:r>
           </a:p>
@@ -1439,38 +1430,37 @@
           <a:p>
             <a:pPr lvl="0"/>
             <a:r>
-              <a:rPr lang="ru-RU" smtClean="0"/>
+              <a:rPr lang="ru-RU"/>
               <a:t>Образец текста</a:t>
             </a:r>
           </a:p>
           <a:p>
             <a:pPr lvl="1"/>
             <a:r>
-              <a:rPr lang="ru-RU" smtClean="0"/>
+              <a:rPr lang="ru-RU"/>
               <a:t>Второй уровень</a:t>
             </a:r>
           </a:p>
           <a:p>
             <a:pPr lvl="2"/>
             <a:r>
-              <a:rPr lang="ru-RU" smtClean="0"/>
+              <a:rPr lang="ru-RU"/>
               <a:t>Третий уровень</a:t>
             </a:r>
           </a:p>
           <a:p>
             <a:pPr lvl="3"/>
             <a:r>
-              <a:rPr lang="ru-RU" smtClean="0"/>
+              <a:rPr lang="ru-RU"/>
               <a:t>Четвертый уровень</a:t>
             </a:r>
           </a:p>
           <a:p>
             <a:pPr lvl="4"/>
             <a:r>
-              <a:rPr lang="ru-RU" smtClean="0"/>
+              <a:rPr lang="ru-RU"/>
               <a:t>Пятый уровень</a:t>
             </a:r>
-            <a:endParaRPr lang="ru-RU"/>
           </a:p>
         </p:txBody>
       </p:sp>
@@ -1533,7 +1523,7 @@
           <a:p>
             <a:pPr lvl="0"/>
             <a:r>
-              <a:rPr lang="ru-RU" smtClean="0"/>
+              <a:rPr lang="ru-RU"/>
               <a:t>Образец текста</a:t>
             </a:r>
           </a:p>
@@ -1561,38 +1551,37 @@
           <a:p>
             <a:pPr lvl="0"/>
             <a:r>
-              <a:rPr lang="ru-RU" smtClean="0"/>
+              <a:rPr lang="ru-RU"/>
               <a:t>Образец текста</a:t>
             </a:r>
           </a:p>
           <a:p>
             <a:pPr lvl="1"/>
             <a:r>
-              <a:rPr lang="ru-RU" smtClean="0"/>
+              <a:rPr lang="ru-RU"/>
               <a:t>Второй уровень</a:t>
             </a:r>
           </a:p>
           <a:p>
             <a:pPr lvl="2"/>
             <a:r>
-              <a:rPr lang="ru-RU" smtClean="0"/>
+              <a:rPr lang="ru-RU"/>
               <a:t>Третий уровень</a:t>
             </a:r>
           </a:p>
           <a:p>
             <a:pPr lvl="3"/>
             <a:r>
-              <a:rPr lang="ru-RU" smtClean="0"/>
+              <a:rPr lang="ru-RU"/>
               <a:t>Четвертый уровень</a:t>
             </a:r>
           </a:p>
           <a:p>
             <a:pPr lvl="4"/>
             <a:r>
-              <a:rPr lang="ru-RU" smtClean="0"/>
+              <a:rPr lang="ru-RU"/>
               <a:t>Пятый уровень</a:t>
             </a:r>
-            <a:endParaRPr lang="ru-RU"/>
           </a:p>
         </p:txBody>
       </p:sp>
@@ -1613,7 +1602,7 @@
           <a:p>
             <a:fld id="{CB8AB8CA-94B0-4D70-B3AA-F4F604145185}" type="datetimeFigureOut">
               <a:rPr lang="ru-RU" smtClean="0"/>
-              <a:t>21.12.2020</a:t>
+              <a:t>22.12.2020</a:t>
             </a:fld>
             <a:endParaRPr lang="ru-RU"/>
           </a:p>
@@ -1707,10 +1696,9 @@
           <a:lstStyle/>
           <a:p>
             <a:r>
-              <a:rPr lang="ru-RU" smtClean="0"/>
+              <a:rPr lang="ru-RU"/>
               <a:t>Образец заголовка</a:t>
             </a:r>
-            <a:endParaRPr lang="ru-RU"/>
           </a:p>
         </p:txBody>
       </p:sp>
@@ -1731,7 +1719,7 @@
           <a:p>
             <a:fld id="{CB8AB8CA-94B0-4D70-B3AA-F4F604145185}" type="datetimeFigureOut">
               <a:rPr lang="ru-RU" smtClean="0"/>
-              <a:t>21.12.2020</a:t>
+              <a:t>22.12.2020</a:t>
             </a:fld>
             <a:endParaRPr lang="ru-RU"/>
           </a:p>
@@ -1826,7 +1814,7 @@
           <a:p>
             <a:fld id="{CB8AB8CA-94B0-4D70-B3AA-F4F604145185}" type="datetimeFigureOut">
               <a:rPr lang="ru-RU" smtClean="0"/>
-              <a:t>21.12.2020</a:t>
+              <a:t>22.12.2020</a:t>
             </a:fld>
             <a:endParaRPr lang="ru-RU"/>
           </a:p>
@@ -1929,10 +1917,9 @@
           </a:lstStyle>
           <a:p>
             <a:r>
-              <a:rPr lang="ru-RU" smtClean="0"/>
+              <a:rPr lang="ru-RU"/>
               <a:t>Образец заголовка</a:t>
             </a:r>
-            <a:endParaRPr lang="ru-RU"/>
           </a:p>
         </p:txBody>
       </p:sp>
@@ -1986,38 +1973,37 @@
           <a:p>
             <a:pPr lvl="0"/>
             <a:r>
-              <a:rPr lang="ru-RU" smtClean="0"/>
+              <a:rPr lang="ru-RU"/>
               <a:t>Образец текста</a:t>
             </a:r>
           </a:p>
           <a:p>
             <a:pPr lvl="1"/>
             <a:r>
-              <a:rPr lang="ru-RU" smtClean="0"/>
+              <a:rPr lang="ru-RU"/>
               <a:t>Второй уровень</a:t>
             </a:r>
           </a:p>
           <a:p>
             <a:pPr lvl="2"/>
             <a:r>
-              <a:rPr lang="ru-RU" smtClean="0"/>
+              <a:rPr lang="ru-RU"/>
               <a:t>Третий уровень</a:t>
             </a:r>
           </a:p>
           <a:p>
             <a:pPr lvl="3"/>
             <a:r>
-              <a:rPr lang="ru-RU" smtClean="0"/>
+              <a:rPr lang="ru-RU"/>
               <a:t>Четвертый уровень</a:t>
             </a:r>
           </a:p>
           <a:p>
             <a:pPr lvl="4"/>
             <a:r>
-              <a:rPr lang="ru-RU" smtClean="0"/>
+              <a:rPr lang="ru-RU"/>
               <a:t>Пятый уровень</a:t>
             </a:r>
-            <a:endParaRPr lang="ru-RU"/>
           </a:p>
         </p:txBody>
       </p:sp>
@@ -2080,7 +2066,7 @@
           <a:p>
             <a:pPr lvl="0"/>
             <a:r>
-              <a:rPr lang="ru-RU" smtClean="0"/>
+              <a:rPr lang="ru-RU"/>
               <a:t>Образец текста</a:t>
             </a:r>
           </a:p>
@@ -2103,7 +2089,7 @@
           <a:p>
             <a:fld id="{CB8AB8CA-94B0-4D70-B3AA-F4F604145185}" type="datetimeFigureOut">
               <a:rPr lang="ru-RU" smtClean="0"/>
-              <a:t>21.12.2020</a:t>
+              <a:t>22.12.2020</a:t>
             </a:fld>
             <a:endParaRPr lang="ru-RU"/>
           </a:p>
@@ -2206,10 +2192,9 @@
           </a:lstStyle>
           <a:p>
             <a:r>
-              <a:rPr lang="ru-RU" smtClean="0"/>
+              <a:rPr lang="ru-RU"/>
               <a:t>Образец заголовка</a:t>
             </a:r>
-            <a:endParaRPr lang="ru-RU"/>
           </a:p>
         </p:txBody>
       </p:sp>
@@ -2333,7 +2318,7 @@
           <a:p>
             <a:pPr lvl="0"/>
             <a:r>
-              <a:rPr lang="ru-RU" smtClean="0"/>
+              <a:rPr lang="ru-RU"/>
               <a:t>Образец текста</a:t>
             </a:r>
           </a:p>
@@ -2356,7 +2341,7 @@
           <a:p>
             <a:fld id="{CB8AB8CA-94B0-4D70-B3AA-F4F604145185}" type="datetimeFigureOut">
               <a:rPr lang="ru-RU" smtClean="0"/>
-              <a:t>21.12.2020</a:t>
+              <a:t>22.12.2020</a:t>
             </a:fld>
             <a:endParaRPr lang="ru-RU"/>
           </a:p>
@@ -2465,10 +2450,9 @@
           <a:lstStyle/>
           <a:p>
             <a:r>
-              <a:rPr lang="ru-RU" smtClean="0"/>
+              <a:rPr lang="ru-RU"/>
               <a:t>Образец заголовка</a:t>
             </a:r>
-            <a:endParaRPr lang="ru-RU"/>
           </a:p>
         </p:txBody>
       </p:sp>
@@ -2499,38 +2483,37 @@
           <a:p>
             <a:pPr lvl="0"/>
             <a:r>
-              <a:rPr lang="ru-RU" smtClean="0"/>
+              <a:rPr lang="ru-RU"/>
               <a:t>Образец текста</a:t>
             </a:r>
           </a:p>
           <a:p>
             <a:pPr lvl="1"/>
             <a:r>
-              <a:rPr lang="ru-RU" smtClean="0"/>
+              <a:rPr lang="ru-RU"/>
               <a:t>Второй уровень</a:t>
             </a:r>
           </a:p>
           <a:p>
             <a:pPr lvl="2"/>
             <a:r>
-              <a:rPr lang="ru-RU" smtClean="0"/>
+              <a:rPr lang="ru-RU"/>
               <a:t>Третий уровень</a:t>
             </a:r>
           </a:p>
           <a:p>
             <a:pPr lvl="3"/>
             <a:r>
-              <a:rPr lang="ru-RU" smtClean="0"/>
+              <a:rPr lang="ru-RU"/>
               <a:t>Четвертый уровень</a:t>
             </a:r>
           </a:p>
           <a:p>
             <a:pPr lvl="4"/>
             <a:r>
-              <a:rPr lang="ru-RU" smtClean="0"/>
+              <a:rPr lang="ru-RU"/>
               <a:t>Пятый уровень</a:t>
             </a:r>
-            <a:endParaRPr lang="ru-RU"/>
           </a:p>
         </p:txBody>
       </p:sp>
@@ -2569,7 +2552,7 @@
           <a:p>
             <a:fld id="{CB8AB8CA-94B0-4D70-B3AA-F4F604145185}" type="datetimeFigureOut">
               <a:rPr lang="ru-RU" smtClean="0"/>
-              <a:t>21.12.2020</a:t>
+              <a:t>22.12.2020</a:t>
             </a:fld>
             <a:endParaRPr lang="ru-RU"/>
           </a:p>
@@ -2993,7 +2976,7 @@
           </a:ln>
           <a:extLst>
             <a:ext uri="{C572A759-6A51-4108-AA02-DFA0A04FC94B}">
-              <ma14:wrappingTextBoxFlag xmlns="" xmlns:m="http://schemas.openxmlformats.org/officeDocument/2006/math" xmlns:a14="http://schemas.microsoft.com/office/drawing/2010/main" xmlns:ma14="http://schemas.microsoft.com/office/mac/drawingml/2011/main" val="1"/>
+              <ma14:wrappingTextBoxFlag xmlns:ma14="http://schemas.microsoft.com/office/mac/drawingml/2011/main" xmlns:a14="http://schemas.microsoft.com/office/drawing/2010/main" xmlns:m="http://schemas.openxmlformats.org/officeDocument/2006/math" xmlns="" val="1"/>
             </a:ext>
           </a:extLst>
         </p:spPr>
@@ -3083,10 +3066,6 @@
               <a:rPr lang="ru-RU" sz="4100" dirty="0"/>
               <a:t>Синтаксически-управляемый семантический анализ</a:t>
             </a:r>
-            <a:r>
-              <a:rPr dirty="0"/>
-              <a:t/>
-            </a:r>
             <a:br>
               <a:rPr dirty="0"/>
             </a:br>
@@ -3234,7 +3213,7 @@
           </a:ln>
           <a:extLst>
             <a:ext uri="{C572A759-6A51-4108-AA02-DFA0A04FC94B}">
-              <ma14:wrappingTextBoxFlag xmlns="" xmlns:m="http://schemas.openxmlformats.org/officeDocument/2006/math" xmlns:a14="http://schemas.microsoft.com/office/drawing/2010/main" xmlns:ma14="http://schemas.microsoft.com/office/mac/drawingml/2011/main" val="1"/>
+              <ma14:wrappingTextBoxFlag xmlns:ma14="http://schemas.microsoft.com/office/mac/drawingml/2011/main" xmlns:a14="http://schemas.microsoft.com/office/drawing/2010/main" xmlns:m="http://schemas.openxmlformats.org/officeDocument/2006/math" xmlns="" val="1"/>
             </a:ext>
           </a:extLst>
         </p:spPr>
@@ -3359,76 +3338,29 @@
             </a:lvl1pPr>
           </a:lstStyle>
           <a:p>
-            <a:r>
-              <a:rPr lang="ru-RU" sz="2800" dirty="0" smtClean="0"/>
-              <a:t/>
-            </a:r>
             <a:br>
-              <a:rPr lang="ru-RU" sz="2800" dirty="0" smtClean="0"/>
+              <a:rPr lang="ru-RU" sz="2800" dirty="0"/>
             </a:br>
             <a:r>
-              <a:rPr lang="ru-RU" sz="2800" dirty="0" smtClean="0"/>
+              <a:rPr lang="ru-RU" sz="2800" dirty="0"/>
               <a:t>В)Выполните разбор данной цепочки в соответствии с алгоритмом «сдвиг-свертка». Убедитесь, что в работе алгоритма появляется то же дерево, что было построено на шаге б).</a:t>
             </a:r>
             <a:br>
-              <a:rPr lang="ru-RU" sz="2800" dirty="0" smtClean="0"/>
+              <a:rPr lang="ru-RU" sz="2800" dirty="0"/>
             </a:br>
             <a:endParaRPr lang="ru-RU" sz="2800" dirty="0"/>
           </a:p>
         </p:txBody>
       </p:sp>
-      <p:sp>
-        <p:nvSpPr>
-          <p:cNvPr id="5" name="TextBox 4"/>
-          <p:cNvSpPr txBox="1"/>
-          <p:nvPr/>
-        </p:nvSpPr>
-        <p:spPr>
-          <a:xfrm>
-            <a:off x="838200" y="1675466"/>
-            <a:ext cx="5555411" cy="369332"/>
-          </a:xfrm>
-          <a:prstGeom prst="rect">
-            <a:avLst/>
-          </a:prstGeom>
-          <a:noFill/>
-        </p:spPr>
-        <p:txBody>
-          <a:bodyPr wrap="square" rtlCol="0">
-            <a:spAutoFit/>
-          </a:bodyPr>
-          <a:lstStyle/>
-          <a:p>
-            <a:r>
-              <a:rPr lang="en-US" dirty="0" smtClean="0"/>
-              <a:t>9)  </a:t>
-            </a:r>
-            <a:r>
-              <a:rPr lang="ru-RU" dirty="0" smtClean="0"/>
-              <a:t>А</a:t>
-            </a:r>
-            <a:r>
-              <a:rPr lang="en-US" dirty="0" smtClean="0"/>
-              <a:t>b</a:t>
-            </a:r>
-            <a:r>
-              <a:rPr lang="ru-RU" dirty="0" smtClean="0"/>
-              <a:t> </a:t>
-            </a:r>
-            <a:r>
-              <a:rPr lang="en-US" dirty="0" smtClean="0"/>
-              <a:t>// </a:t>
-            </a:r>
-            <a:r>
-              <a:rPr lang="ru-RU" dirty="0" smtClean="0"/>
-              <a:t>свёртка</a:t>
-            </a:r>
-          </a:p>
-        </p:txBody>
-      </p:sp>
       <p:pic>
         <p:nvPicPr>
-          <p:cNvPr id="6" name="Рисунок 5"/>
+          <p:cNvPr id="7" name="Рисунок 6">
+            <a:extLst>
+              <a:ext uri="{FF2B5EF4-FFF2-40B4-BE49-F238E27FC236}">
+                <a16:creationId xmlns:a16="http://schemas.microsoft.com/office/drawing/2014/main" id="{0001D865-EC39-493A-BA84-606E2412B24E}"/>
+              </a:ext>
+            </a:extLst>
+          </p:cNvPr>
           <p:cNvPicPr>
             <a:picLocks noChangeAspect="1"/>
           </p:cNvPicPr>
@@ -3442,70 +3374,23 @@
         </p:blipFill>
         <p:spPr>
           <a:xfrm>
-            <a:off x="1114246" y="2144594"/>
-            <a:ext cx="4027098" cy="4507317"/>
+            <a:off x="6947793" y="2045322"/>
+            <a:ext cx="4052716" cy="4650232"/>
           </a:xfrm>
           <a:prstGeom prst="rect">
             <a:avLst/>
           </a:prstGeom>
         </p:spPr>
       </p:pic>
-      <p:sp>
-        <p:nvSpPr>
-          <p:cNvPr id="8" name="TextBox 7"/>
-          <p:cNvSpPr txBox="1"/>
-          <p:nvPr/>
-        </p:nvSpPr>
-        <p:spPr>
-          <a:xfrm>
-            <a:off x="6244805" y="1725364"/>
-            <a:ext cx="5555411" cy="369332"/>
-          </a:xfrm>
-          <a:prstGeom prst="rect">
-            <a:avLst/>
-          </a:prstGeom>
-          <a:noFill/>
-        </p:spPr>
-        <p:txBody>
-          <a:bodyPr wrap="square" rtlCol="0">
-            <a:spAutoFit/>
-          </a:bodyPr>
-          <a:lstStyle/>
-          <a:p>
-            <a:r>
-              <a:rPr lang="ru-RU" dirty="0" smtClean="0"/>
-              <a:t>10</a:t>
-            </a:r>
-            <a:r>
-              <a:rPr lang="en-US" dirty="0" smtClean="0"/>
-              <a:t>)  </a:t>
-            </a:r>
-            <a:r>
-              <a:rPr lang="ru-RU" dirty="0" smtClean="0"/>
-              <a:t>А</a:t>
-            </a:r>
-            <a:r>
-              <a:rPr lang="en-US" dirty="0" smtClean="0"/>
-              <a:t>B</a:t>
-            </a:r>
-            <a:r>
-              <a:rPr lang="ru-RU" dirty="0" smtClean="0"/>
-              <a:t> </a:t>
-            </a:r>
-            <a:r>
-              <a:rPr lang="en-US" dirty="0" smtClean="0"/>
-              <a:t>// </a:t>
-            </a:r>
-            <a:r>
-              <a:rPr lang="ru-RU" dirty="0" smtClean="0"/>
-              <a:t>свёртка</a:t>
-            </a:r>
-          </a:p>
-        </p:txBody>
-      </p:sp>
       <p:pic>
         <p:nvPicPr>
-          <p:cNvPr id="9" name="Рисунок 8"/>
+          <p:cNvPr id="8" name="Рисунок 7">
+            <a:extLst>
+              <a:ext uri="{FF2B5EF4-FFF2-40B4-BE49-F238E27FC236}">
+                <a16:creationId xmlns:a16="http://schemas.microsoft.com/office/drawing/2014/main" id="{B4153B1B-8BB3-4A54-9706-DC0D44AFE9B1}"/>
+              </a:ext>
+            </a:extLst>
+          </p:cNvPr>
           <p:cNvPicPr>
             <a:picLocks noChangeAspect="1"/>
           </p:cNvPicPr>
@@ -3519,188 +3404,14 @@
         </p:blipFill>
         <p:spPr>
           <a:xfrm>
-            <a:off x="7282851" y="2094696"/>
-            <a:ext cx="3672697" cy="4562178"/>
+            <a:off x="1191491" y="2045322"/>
+            <a:ext cx="3140363" cy="4746755"/>
           </a:xfrm>
           <a:prstGeom prst="rect">
             <a:avLst/>
           </a:prstGeom>
         </p:spPr>
       </p:pic>
-    </p:spTree>
-    <p:extLst>
-      <p:ext uri="{BB962C8B-B14F-4D97-AF65-F5344CB8AC3E}">
-        <p14:creationId xmlns:p14="http://schemas.microsoft.com/office/powerpoint/2010/main" val="3448293326"/>
-      </p:ext>
-    </p:extLst>
-  </p:cSld>
-  <p:clrMapOvr>
-    <a:masterClrMapping/>
-  </p:clrMapOvr>
-</p:sld>
-</file>
-
-<file path=ppt/slides/slide11.xml><?xml version="1.0" encoding="utf-8"?>
-<p:sld xmlns:a="http://schemas.openxmlformats.org/drawingml/2006/main" xmlns:r="http://schemas.openxmlformats.org/officeDocument/2006/relationships" xmlns:p="http://schemas.openxmlformats.org/presentationml/2006/main">
-  <p:cSld>
-    <p:spTree>
-      <p:nvGrpSpPr>
-        <p:cNvPr id="1" name=""/>
-        <p:cNvGrpSpPr/>
-        <p:nvPr/>
-      </p:nvGrpSpPr>
-      <p:grpSpPr>
-        <a:xfrm>
-          <a:off x="0" y="0"/>
-          <a:ext cx="0" cy="0"/>
-          <a:chOff x="0" y="0"/>
-          <a:chExt cx="0" cy="0"/>
-        </a:xfrm>
-      </p:grpSpPr>
-      <p:sp>
-        <p:nvSpPr>
-          <p:cNvPr id="4" name="Заголовок 1"/>
-          <p:cNvSpPr txBox="1">
-            <a:spLocks/>
-          </p:cNvSpPr>
-          <p:nvPr/>
-        </p:nvSpPr>
-        <p:spPr>
-          <a:xfrm>
-            <a:off x="838200" y="250107"/>
-            <a:ext cx="10515600" cy="1325563"/>
-          </a:xfrm>
-          <a:prstGeom prst="rect">
-            <a:avLst/>
-          </a:prstGeom>
-        </p:spPr>
-        <p:txBody>
-          <a:bodyPr vert="horz" lIns="91440" tIns="45720" rIns="91440" bIns="45720" rtlCol="0" anchor="ctr">
-            <a:noAutofit/>
-          </a:bodyPr>
-          <a:lstStyle>
-            <a:lvl1pPr algn="l" defTabSz="914400" rtl="0" eaLnBrk="1" latinLnBrk="0" hangingPunct="1">
-              <a:lnSpc>
-                <a:spcPct val="90000"/>
-              </a:lnSpc>
-              <a:spcBef>
-                <a:spcPct val="0"/>
-              </a:spcBef>
-              <a:buNone/>
-              <a:defRPr sz="4400" kern="1200">
-                <a:solidFill>
-                  <a:schemeClr val="tx1"/>
-                </a:solidFill>
-                <a:latin typeface="+mj-lt"/>
-                <a:ea typeface="+mj-ea"/>
-                <a:cs typeface="+mj-cs"/>
-              </a:defRPr>
-            </a:lvl1pPr>
-          </a:lstStyle>
-          <a:p>
-            <a:r>
-              <a:rPr lang="ru-RU" sz="2800" dirty="0" smtClean="0"/>
-              <a:t/>
-            </a:r>
-            <a:br>
-              <a:rPr lang="ru-RU" sz="2800" dirty="0" smtClean="0"/>
-            </a:br>
-            <a:r>
-              <a:rPr lang="ru-RU" sz="2800" dirty="0" smtClean="0"/>
-              <a:t>В)Выполните разбор данной цепочки в соответствии с алгоритмом «сдвиг-свертка». Убедитесь, что в работе алгоритма появляется то же дерево, что было построено на шаге б).</a:t>
-            </a:r>
-            <a:br>
-              <a:rPr lang="ru-RU" sz="2800" dirty="0" smtClean="0"/>
-            </a:br>
-            <a:endParaRPr lang="ru-RU" sz="2800" dirty="0"/>
-          </a:p>
-        </p:txBody>
-      </p:sp>
-      <p:pic>
-        <p:nvPicPr>
-          <p:cNvPr id="5" name="Рисунок 4"/>
-          <p:cNvPicPr>
-            <a:picLocks noChangeAspect="1"/>
-          </p:cNvPicPr>
-          <p:nvPr/>
-        </p:nvPicPr>
-        <p:blipFill>
-          <a:blip r:embed="rId2"/>
-          <a:stretch>
-            <a:fillRect/>
-          </a:stretch>
-        </p:blipFill>
-        <p:spPr>
-          <a:xfrm>
-            <a:off x="4758007" y="1449237"/>
-            <a:ext cx="4166231" cy="5326721"/>
-          </a:xfrm>
-          <a:prstGeom prst="rect">
-            <a:avLst/>
-          </a:prstGeom>
-        </p:spPr>
-      </p:pic>
-      <p:sp>
-        <p:nvSpPr>
-          <p:cNvPr id="6" name="TextBox 5"/>
-          <p:cNvSpPr txBox="1"/>
-          <p:nvPr/>
-        </p:nvSpPr>
-        <p:spPr>
-          <a:xfrm>
-            <a:off x="838200" y="1742617"/>
-            <a:ext cx="5555411" cy="1477328"/>
-          </a:xfrm>
-          <a:prstGeom prst="rect">
-            <a:avLst/>
-          </a:prstGeom>
-          <a:noFill/>
-        </p:spPr>
-        <p:txBody>
-          <a:bodyPr wrap="square" rtlCol="0">
-            <a:spAutoFit/>
-          </a:bodyPr>
-          <a:lstStyle/>
-          <a:p>
-            <a:pPr marL="342900" indent="-342900">
-              <a:buAutoNum type="arabicParenR" startAt="11"/>
-            </a:pPr>
-            <a:r>
-              <a:rPr lang="en-US" dirty="0" smtClean="0"/>
-              <a:t>S</a:t>
-            </a:r>
-          </a:p>
-          <a:p>
-            <a:r>
-              <a:rPr lang="ru-RU" dirty="0" smtClean="0"/>
-              <a:t>Алгоритм закончен, потому что мы пришли в </a:t>
-            </a:r>
-            <a:r>
-              <a:rPr lang="en-US" dirty="0" smtClean="0"/>
-              <a:t>S </a:t>
-            </a:r>
-            <a:r>
-              <a:rPr lang="ru-RU" dirty="0" smtClean="0"/>
-              <a:t>больше нечего сдвигать или </a:t>
-            </a:r>
-            <a:r>
-              <a:rPr lang="ru-RU" dirty="0" err="1" smtClean="0"/>
-              <a:t>свертать</a:t>
-            </a:r>
-            <a:r>
-              <a:rPr lang="ru-RU" dirty="0" smtClean="0"/>
-              <a:t/>
-            </a:r>
-            <a:br>
-              <a:rPr lang="ru-RU" dirty="0" smtClean="0"/>
-            </a:br>
-            <a:r>
-              <a:rPr lang="ru-RU" dirty="0" smtClean="0"/>
-              <a:t>Вывод: Дерево построенное на шаге Б то же, что и построенное в ходе алгоритма.</a:t>
-            </a:r>
-          </a:p>
-        </p:txBody>
-      </p:sp>
     </p:spTree>
     <p:extLst>
       <p:ext uri="{BB962C8B-B14F-4D97-AF65-F5344CB8AC3E}">
@@ -3749,18 +3460,9 @@
           <a:lstStyle/>
           <a:p>
             <a:r>
-              <a:rPr lang="ru-RU" dirty="0" smtClean="0"/>
-              <a:t>А)Выбрать </a:t>
-            </a:r>
-            <a:r>
               <a:rPr lang="ru-RU" dirty="0"/>
-              <a:t>грамматику в упр. 9.1 или 9.2 задачника</a:t>
-            </a:r>
-            <a:r>
-              <a:rPr lang="ru-RU" dirty="0" smtClean="0"/>
-              <a:t>.</a:t>
-            </a:r>
-            <a:endParaRPr lang="ru-RU" dirty="0"/>
+              <a:t>А)Выбрать грамматику в упр. 9.1 или 9.2 задачника.</a:t>
+            </a:r>
           </a:p>
         </p:txBody>
       </p:sp>
@@ -3782,64 +3484,56 @@
           <a:lstStyle/>
           <a:p>
             <a:r>
-              <a:rPr lang="en-US" sz="6000" dirty="0" smtClean="0"/>
+              <a:rPr lang="ru-RU" sz="6000" dirty="0"/>
+              <a:t>9.1 </a:t>
+            </a:r>
+            <a:r>
+              <a:rPr lang="en-US" sz="6000" dirty="0"/>
               <a:t>a) </a:t>
             </a:r>
             <a:r>
-              <a:rPr lang="ru-RU" sz="6000" dirty="0" smtClean="0"/>
+              <a:rPr lang="ru-RU" sz="6000" dirty="0"/>
               <a:t>Пример цепочки: </a:t>
             </a:r>
             <a:r>
-              <a:rPr lang="en-US" sz="6000" dirty="0" err="1" smtClean="0"/>
+              <a:rPr lang="en-US" sz="6000" dirty="0" err="1"/>
               <a:t>abbb</a:t>
             </a:r>
             <a:r>
-              <a:rPr lang="ru-RU" sz="6000" dirty="0" smtClean="0"/>
+              <a:rPr lang="ru-RU" sz="6000" dirty="0"/>
               <a:t> </a:t>
-            </a:r>
-            <a:r>
-              <a:rPr lang="ru-RU" sz="6000" dirty="0"/>
-              <a:t/>
             </a:r>
             <a:br>
               <a:rPr lang="ru-RU" sz="6000" dirty="0"/>
             </a:br>
             <a:r>
-              <a:rPr lang="ru-RU" sz="6000" dirty="0" smtClean="0"/>
+              <a:rPr lang="ru-RU" sz="6000" dirty="0"/>
               <a:t>	</a:t>
             </a:r>
             <a:r>
-              <a:rPr lang="en-US" sz="6000" dirty="0" smtClean="0"/>
+              <a:rPr lang="en-US" sz="6000" dirty="0"/>
               <a:t>S → AB | BA </a:t>
             </a:r>
-            <a:r>
-              <a:rPr lang="ru-RU" sz="6000" dirty="0" smtClean="0"/>
-              <a:t/>
-            </a:r>
             <a:br>
-              <a:rPr lang="ru-RU" sz="6000" dirty="0" smtClean="0"/>
+              <a:rPr lang="ru-RU" sz="6000" dirty="0"/>
             </a:br>
             <a:r>
-              <a:rPr lang="ru-RU" sz="6000" dirty="0" smtClean="0"/>
+              <a:rPr lang="ru-RU" sz="6000" dirty="0"/>
               <a:t>	</a:t>
             </a:r>
             <a:r>
-              <a:rPr lang="en-US" sz="6000" dirty="0" smtClean="0"/>
+              <a:rPr lang="en-US" sz="6000" dirty="0"/>
               <a:t>A → AB | AA | a </a:t>
             </a:r>
-            <a:r>
-              <a:rPr lang="ru-RU" sz="6000" dirty="0" smtClean="0"/>
-              <a:t/>
-            </a:r>
             <a:br>
-              <a:rPr lang="ru-RU" sz="6000" dirty="0" smtClean="0"/>
+              <a:rPr lang="ru-RU" sz="6000" dirty="0"/>
             </a:br>
             <a:r>
-              <a:rPr lang="ru-RU" sz="6000" dirty="0" smtClean="0"/>
+              <a:rPr lang="ru-RU" sz="6000" dirty="0"/>
               <a:t>	</a:t>
             </a:r>
             <a:r>
-              <a:rPr lang="en-US" sz="6000" dirty="0" smtClean="0"/>
+              <a:rPr lang="en-US" sz="6000" dirty="0"/>
               <a:t>B → b</a:t>
             </a:r>
             <a:endParaRPr lang="ru-RU" sz="6000" dirty="0"/>
@@ -3894,12 +3588,8 @@
           <a:lstStyle/>
           <a:p>
             <a:r>
-              <a:rPr lang="ru-RU" sz="3600" dirty="0" smtClean="0"/>
-              <a:t>Б) Предложите </a:t>
-            </a:r>
-            <a:r>
               <a:rPr lang="ru-RU" sz="3600" dirty="0"/>
-              <a:t>пример синтаксически правильной цепочки для выбранной грамматике. Нужно построить синтаксическое дерево.</a:t>
+              <a:t>Б) Предложите пример синтаксически правильной цепочки для выбранной грамматике. Нужно построить синтаксическое дерево.</a:t>
             </a:r>
             <a:br>
               <a:rPr lang="ru-RU" sz="3600" dirty="0"/>
@@ -3924,14 +3614,14 @@
           <a:lstStyle/>
           <a:p>
             <a:r>
-              <a:rPr lang="ru-RU" dirty="0" smtClean="0"/>
+              <a:rPr lang="ru-RU" dirty="0"/>
               <a:t>Синтаксически правильная цепочка: </a:t>
             </a:r>
             <a:r>
-              <a:rPr lang="en-US" dirty="0" err="1" smtClean="0"/>
+              <a:rPr lang="en-US" dirty="0" err="1"/>
               <a:t>abab</a:t>
             </a:r>
-            <a:endParaRPr lang="ru-RU" dirty="0" smtClean="0"/>
+            <a:endParaRPr lang="ru-RU" dirty="0"/>
           </a:p>
           <a:p>
             <a:pPr marL="0" indent="0">
@@ -4037,6 +3727,112 @@
           </a:prstGeom>
         </p:spPr>
       </p:pic>
+      <p:cxnSp>
+        <p:nvCxnSpPr>
+          <p:cNvPr id="5" name="Прямая соединительная линия 4">
+            <a:extLst>
+              <a:ext uri="{FF2B5EF4-FFF2-40B4-BE49-F238E27FC236}">
+                <a16:creationId xmlns:a16="http://schemas.microsoft.com/office/drawing/2014/main" id="{6D80FFAE-52DB-408C-A04F-E4DD8B1D771D}"/>
+              </a:ext>
+            </a:extLst>
+          </p:cNvPr>
+          <p:cNvCxnSpPr/>
+          <p:nvPr/>
+        </p:nvCxnSpPr>
+        <p:spPr>
+          <a:xfrm>
+            <a:off x="6096000" y="2198254"/>
+            <a:ext cx="0" cy="4680000"/>
+          </a:xfrm>
+          <a:prstGeom prst="line">
+            <a:avLst/>
+          </a:prstGeom>
+        </p:spPr>
+        <p:style>
+          <a:lnRef idx="1">
+            <a:schemeClr val="dk1"/>
+          </a:lnRef>
+          <a:fillRef idx="0">
+            <a:schemeClr val="dk1"/>
+          </a:fillRef>
+          <a:effectRef idx="0">
+            <a:schemeClr val="dk1"/>
+          </a:effectRef>
+          <a:fontRef idx="minor">
+            <a:schemeClr val="tx1"/>
+          </a:fontRef>
+        </p:style>
+      </p:cxnSp>
+      <p:sp>
+        <p:nvSpPr>
+          <p:cNvPr id="6" name="TextBox 5">
+            <a:extLst>
+              <a:ext uri="{FF2B5EF4-FFF2-40B4-BE49-F238E27FC236}">
+                <a16:creationId xmlns:a16="http://schemas.microsoft.com/office/drawing/2014/main" id="{30E696D7-B052-4145-B815-839CB4B6F516}"/>
+              </a:ext>
+            </a:extLst>
+          </p:cNvPr>
+          <p:cNvSpPr txBox="1"/>
+          <p:nvPr/>
+        </p:nvSpPr>
+        <p:spPr>
+          <a:xfrm>
+            <a:off x="572655" y="2484582"/>
+            <a:ext cx="2124363" cy="369332"/>
+          </a:xfrm>
+          <a:prstGeom prst="rect">
+            <a:avLst/>
+          </a:prstGeom>
+          <a:noFill/>
+        </p:spPr>
+        <p:txBody>
+          <a:bodyPr wrap="square" rtlCol="0">
+            <a:spAutoFit/>
+          </a:bodyPr>
+          <a:lstStyle/>
+          <a:p>
+            <a:r>
+              <a:rPr lang="ru-RU" dirty="0"/>
+              <a:t>Шаг 1</a:t>
+            </a:r>
+          </a:p>
+        </p:txBody>
+      </p:sp>
+      <p:sp>
+        <p:nvSpPr>
+          <p:cNvPr id="12" name="TextBox 11">
+            <a:extLst>
+              <a:ext uri="{FF2B5EF4-FFF2-40B4-BE49-F238E27FC236}">
+                <a16:creationId xmlns:a16="http://schemas.microsoft.com/office/drawing/2014/main" id="{00A2A20A-5BEC-49C2-ACB2-C6135EF03E67}"/>
+              </a:ext>
+            </a:extLst>
+          </p:cNvPr>
+          <p:cNvSpPr txBox="1"/>
+          <p:nvPr/>
+        </p:nvSpPr>
+        <p:spPr>
+          <a:xfrm>
+            <a:off x="6514811" y="2484582"/>
+            <a:ext cx="2124363" cy="369332"/>
+          </a:xfrm>
+          <a:prstGeom prst="rect">
+            <a:avLst/>
+          </a:prstGeom>
+          <a:noFill/>
+        </p:spPr>
+        <p:txBody>
+          <a:bodyPr wrap="square" rtlCol="0">
+            <a:spAutoFit/>
+          </a:bodyPr>
+          <a:lstStyle/>
+          <a:p>
+            <a:r>
+              <a:rPr lang="ru-RU" dirty="0"/>
+              <a:t>Шаг 2</a:t>
+            </a:r>
+          </a:p>
+        </p:txBody>
+      </p:sp>
     </p:spTree>
     <p:extLst>
       <p:ext uri="{BB962C8B-B14F-4D97-AF65-F5344CB8AC3E}">
@@ -4109,11 +3905,11 @@
           </a:lstStyle>
           <a:p>
             <a:r>
-              <a:rPr lang="ru-RU" sz="3600" dirty="0" smtClean="0"/>
+              <a:rPr lang="ru-RU" sz="3600" dirty="0"/>
               <a:t>Б) Предложите пример синтаксически правильной цепочки для выбранной грамматике. Нужно построить синтаксическое дерево.</a:t>
             </a:r>
             <a:br>
-              <a:rPr lang="ru-RU" sz="3600" dirty="0" smtClean="0"/>
+              <a:rPr lang="ru-RU" sz="3600" dirty="0"/>
             </a:br>
             <a:endParaRPr lang="ru-RU" sz="3600" dirty="0"/>
           </a:p>
@@ -4121,7 +3917,13 @@
       </p:sp>
       <p:pic>
         <p:nvPicPr>
-          <p:cNvPr id="5" name="Рисунок 4"/>
+          <p:cNvPr id="10" name="Рисунок 9">
+            <a:extLst>
+              <a:ext uri="{FF2B5EF4-FFF2-40B4-BE49-F238E27FC236}">
+                <a16:creationId xmlns:a16="http://schemas.microsoft.com/office/drawing/2014/main" id="{B43E6557-93C0-4EA6-B7A5-A0509D9C6B60}"/>
+              </a:ext>
+            </a:extLst>
+          </p:cNvPr>
           <p:cNvPicPr>
             <a:picLocks noChangeAspect="1"/>
           </p:cNvPicPr>
@@ -4135,8 +3937,8 @@
         </p:blipFill>
         <p:spPr>
           <a:xfrm>
-            <a:off x="239563" y="2501661"/>
-            <a:ext cx="4830307" cy="3748895"/>
+            <a:off x="196160" y="1822547"/>
+            <a:ext cx="5052116" cy="4825902"/>
           </a:xfrm>
           <a:prstGeom prst="rect">
             <a:avLst/>
@@ -4145,7 +3947,13 @@
       </p:pic>
       <p:pic>
         <p:nvPicPr>
-          <p:cNvPr id="6" name="Рисунок 5"/>
+          <p:cNvPr id="12" name="Рисунок 11">
+            <a:extLst>
+              <a:ext uri="{FF2B5EF4-FFF2-40B4-BE49-F238E27FC236}">
+                <a16:creationId xmlns:a16="http://schemas.microsoft.com/office/drawing/2014/main" id="{3F959B36-8D0A-4492-8EFC-C1601FF7ACEE}"/>
+              </a:ext>
+            </a:extLst>
+          </p:cNvPr>
           <p:cNvPicPr>
             <a:picLocks noChangeAspect="1"/>
           </p:cNvPicPr>
@@ -4159,62 +3967,122 @@
         </p:blipFill>
         <p:spPr>
           <a:xfrm>
-            <a:off x="6548527" y="1691862"/>
-            <a:ext cx="3854930" cy="4445831"/>
+            <a:off x="6943725" y="2038349"/>
+            <a:ext cx="4562475" cy="4610100"/>
           </a:xfrm>
           <a:prstGeom prst="rect">
             <a:avLst/>
           </a:prstGeom>
         </p:spPr>
       </p:pic>
-      <p:pic>
-        <p:nvPicPr>
-          <p:cNvPr id="7" name="Рисунок 6"/>
-          <p:cNvPicPr>
-            <a:picLocks noChangeAspect="1"/>
-          </p:cNvPicPr>
+      <p:sp>
+        <p:nvSpPr>
+          <p:cNvPr id="13" name="TextBox 12">
+            <a:extLst>
+              <a:ext uri="{FF2B5EF4-FFF2-40B4-BE49-F238E27FC236}">
+                <a16:creationId xmlns:a16="http://schemas.microsoft.com/office/drawing/2014/main" id="{B8958A77-36F1-4267-9E7C-0C3BB65AFFBC}"/>
+              </a:ext>
+            </a:extLst>
+          </p:cNvPr>
+          <p:cNvSpPr txBox="1"/>
           <p:nvPr/>
-        </p:nvPicPr>
-        <p:blipFill>
-          <a:blip r:embed="rId4"/>
-          <a:stretch>
-            <a:fillRect/>
-          </a:stretch>
-        </p:blipFill>
-        <p:spPr>
-          <a:xfrm>
-            <a:off x="3984595" y="5623343"/>
-            <a:ext cx="962025" cy="514350"/>
+        </p:nvSpPr>
+        <p:spPr>
+          <a:xfrm>
+            <a:off x="332509" y="2038349"/>
+            <a:ext cx="2124363" cy="369332"/>
           </a:xfrm>
           <a:prstGeom prst="rect">
             <a:avLst/>
           </a:prstGeom>
-        </p:spPr>
-      </p:pic>
-      <p:pic>
-        <p:nvPicPr>
-          <p:cNvPr id="8" name="Рисунок 7"/>
-          <p:cNvPicPr>
-            <a:picLocks noChangeAspect="1"/>
-          </p:cNvPicPr>
+          <a:noFill/>
+        </p:spPr>
+        <p:txBody>
+          <a:bodyPr wrap="square" rtlCol="0">
+            <a:spAutoFit/>
+          </a:bodyPr>
+          <a:lstStyle/>
+          <a:p>
+            <a:r>
+              <a:rPr lang="ru-RU" dirty="0"/>
+              <a:t>Шаг 3</a:t>
+            </a:r>
+          </a:p>
+        </p:txBody>
+      </p:sp>
+      <p:sp>
+        <p:nvSpPr>
+          <p:cNvPr id="14" name="TextBox 13">
+            <a:extLst>
+              <a:ext uri="{FF2B5EF4-FFF2-40B4-BE49-F238E27FC236}">
+                <a16:creationId xmlns:a16="http://schemas.microsoft.com/office/drawing/2014/main" id="{8E45CFA7-67E6-4857-82DB-0F9AB5D4ACEA}"/>
+              </a:ext>
+            </a:extLst>
+          </p:cNvPr>
+          <p:cNvSpPr txBox="1"/>
           <p:nvPr/>
-        </p:nvPicPr>
-        <p:blipFill>
-          <a:blip r:embed="rId4"/>
-          <a:stretch>
-            <a:fillRect/>
-          </a:stretch>
-        </p:blipFill>
-        <p:spPr>
-          <a:xfrm>
-            <a:off x="9643457" y="5736566"/>
-            <a:ext cx="734122" cy="392501"/>
+        </p:nvSpPr>
+        <p:spPr>
+          <a:xfrm>
+            <a:off x="6534727" y="2038349"/>
+            <a:ext cx="2124363" cy="369332"/>
           </a:xfrm>
           <a:prstGeom prst="rect">
             <a:avLst/>
           </a:prstGeom>
-        </p:spPr>
-      </p:pic>
+          <a:noFill/>
+        </p:spPr>
+        <p:txBody>
+          <a:bodyPr wrap="square" rtlCol="0">
+            <a:spAutoFit/>
+          </a:bodyPr>
+          <a:lstStyle/>
+          <a:p>
+            <a:r>
+              <a:rPr lang="ru-RU" dirty="0"/>
+              <a:t>Шаг 4</a:t>
+            </a:r>
+          </a:p>
+        </p:txBody>
+      </p:sp>
+      <p:cxnSp>
+        <p:nvCxnSpPr>
+          <p:cNvPr id="15" name="Прямая соединительная линия 14">
+            <a:extLst>
+              <a:ext uri="{FF2B5EF4-FFF2-40B4-BE49-F238E27FC236}">
+                <a16:creationId xmlns:a16="http://schemas.microsoft.com/office/drawing/2014/main" id="{B2D460EE-7E39-4FAE-BAF5-CB3AC6122F55}"/>
+              </a:ext>
+            </a:extLst>
+          </p:cNvPr>
+          <p:cNvCxnSpPr>
+            <a:cxnSpLocks/>
+          </p:cNvCxnSpPr>
+          <p:nvPr/>
+        </p:nvCxnSpPr>
+        <p:spPr>
+          <a:xfrm>
+            <a:off x="5763491" y="1549928"/>
+            <a:ext cx="0" cy="5308072"/>
+          </a:xfrm>
+          <a:prstGeom prst="line">
+            <a:avLst/>
+          </a:prstGeom>
+        </p:spPr>
+        <p:style>
+          <a:lnRef idx="1">
+            <a:schemeClr val="dk1"/>
+          </a:lnRef>
+          <a:fillRef idx="0">
+            <a:schemeClr val="dk1"/>
+          </a:fillRef>
+          <a:effectRef idx="0">
+            <a:schemeClr val="dk1"/>
+          </a:effectRef>
+          <a:fontRef idx="minor">
+            <a:schemeClr val="tx1"/>
+          </a:fontRef>
+        </p:style>
+      </p:cxnSp>
     </p:spTree>
     <p:extLst>
       <p:ext uri="{BB962C8B-B14F-4D97-AF65-F5344CB8AC3E}">
@@ -4264,19 +4132,20 @@
           <a:p>
             <a:r>
               <a:rPr lang="ru-RU" sz="3600" dirty="0"/>
-              <a:t>Б) Предложите пример синтаксически правильной цепочки для выбранной грамматике. Нужно построить синтаксическое дерево</a:t>
-            </a:r>
-            <a:r>
-              <a:rPr lang="ru-RU" sz="3600" dirty="0" smtClean="0"/>
-              <a:t>.</a:t>
-            </a:r>
-            <a:endParaRPr lang="ru-RU" sz="3600" dirty="0"/>
+              <a:t>Б) Предложите пример синтаксически правильной цепочки для выбранной грамматике. Нужно построить синтаксическое дерево.</a:t>
+            </a:r>
           </a:p>
         </p:txBody>
       </p:sp>
       <p:pic>
         <p:nvPicPr>
-          <p:cNvPr id="4" name="Рисунок 3"/>
+          <p:cNvPr id="9" name="Рисунок 8">
+            <a:extLst>
+              <a:ext uri="{FF2B5EF4-FFF2-40B4-BE49-F238E27FC236}">
+                <a16:creationId xmlns:a16="http://schemas.microsoft.com/office/drawing/2014/main" id="{8D46905F-29C5-415E-9B23-C362C84A5B91}"/>
+              </a:ext>
+            </a:extLst>
+          </p:cNvPr>
           <p:cNvPicPr>
             <a:picLocks noChangeAspect="1"/>
           </p:cNvPicPr>
@@ -4290,8 +4159,8 @@
         </p:blipFill>
         <p:spPr>
           <a:xfrm>
-            <a:off x="462142" y="2079636"/>
-            <a:ext cx="4135737" cy="4467199"/>
+            <a:off x="563852" y="1779272"/>
+            <a:ext cx="4026622" cy="4972076"/>
           </a:xfrm>
           <a:prstGeom prst="rect">
             <a:avLst/>
@@ -4300,7 +4169,13 @@
       </p:pic>
       <p:pic>
         <p:nvPicPr>
-          <p:cNvPr id="5" name="Рисунок 4"/>
+          <p:cNvPr id="11" name="Рисунок 10">
+            <a:extLst>
+              <a:ext uri="{FF2B5EF4-FFF2-40B4-BE49-F238E27FC236}">
+                <a16:creationId xmlns:a16="http://schemas.microsoft.com/office/drawing/2014/main" id="{6533C05A-5EA0-44DE-99A5-CFAF3D5D173B}"/>
+              </a:ext>
+            </a:extLst>
+          </p:cNvPr>
           <p:cNvPicPr>
             <a:picLocks noChangeAspect="1"/>
           </p:cNvPicPr>
@@ -4314,86 +4189,122 @@
         </p:blipFill>
         <p:spPr>
           <a:xfrm>
-            <a:off x="4688366" y="2163056"/>
-            <a:ext cx="3683375" cy="4383779"/>
+            <a:off x="6947621" y="1799405"/>
+            <a:ext cx="3850679" cy="4972076"/>
           </a:xfrm>
           <a:prstGeom prst="rect">
             <a:avLst/>
           </a:prstGeom>
         </p:spPr>
       </p:pic>
-      <p:pic>
-        <p:nvPicPr>
-          <p:cNvPr id="6" name="Рисунок 5"/>
-          <p:cNvPicPr>
-            <a:picLocks noChangeAspect="1"/>
-          </p:cNvPicPr>
+      <p:cxnSp>
+        <p:nvCxnSpPr>
+          <p:cNvPr id="12" name="Прямая соединительная линия 11">
+            <a:extLst>
+              <a:ext uri="{FF2B5EF4-FFF2-40B4-BE49-F238E27FC236}">
+                <a16:creationId xmlns:a16="http://schemas.microsoft.com/office/drawing/2014/main" id="{59EB8300-85B3-4F9E-8959-DA71DF7EDFD1}"/>
+              </a:ext>
+            </a:extLst>
+          </p:cNvPr>
+          <p:cNvCxnSpPr>
+            <a:cxnSpLocks/>
+          </p:cNvCxnSpPr>
           <p:nvPr/>
-        </p:nvPicPr>
-        <p:blipFill>
-          <a:blip r:embed="rId4"/>
-          <a:stretch>
-            <a:fillRect/>
-          </a:stretch>
-        </p:blipFill>
-        <p:spPr>
-          <a:xfrm>
-            <a:off x="3726341" y="6136209"/>
-            <a:ext cx="768021" cy="410625"/>
+        </p:nvCxnSpPr>
+        <p:spPr>
+          <a:xfrm>
+            <a:off x="5763491" y="1549928"/>
+            <a:ext cx="0" cy="5308072"/>
+          </a:xfrm>
+          <a:prstGeom prst="line">
+            <a:avLst/>
+          </a:prstGeom>
+        </p:spPr>
+        <p:style>
+          <a:lnRef idx="1">
+            <a:schemeClr val="dk1"/>
+          </a:lnRef>
+          <a:fillRef idx="0">
+            <a:schemeClr val="dk1"/>
+          </a:fillRef>
+          <a:effectRef idx="0">
+            <a:schemeClr val="dk1"/>
+          </a:effectRef>
+          <a:fontRef idx="minor">
+            <a:schemeClr val="tx1"/>
+          </a:fontRef>
+        </p:style>
+      </p:cxnSp>
+      <p:sp>
+        <p:nvSpPr>
+          <p:cNvPr id="13" name="TextBox 12">
+            <a:extLst>
+              <a:ext uri="{FF2B5EF4-FFF2-40B4-BE49-F238E27FC236}">
+                <a16:creationId xmlns:a16="http://schemas.microsoft.com/office/drawing/2014/main" id="{879103F9-08D9-4E18-B0C5-11A1394FB424}"/>
+              </a:ext>
+            </a:extLst>
+          </p:cNvPr>
+          <p:cNvSpPr txBox="1"/>
+          <p:nvPr/>
+        </p:nvSpPr>
+        <p:spPr>
+          <a:xfrm>
+            <a:off x="332509" y="2038349"/>
+            <a:ext cx="2124363" cy="369332"/>
           </a:xfrm>
           <a:prstGeom prst="rect">
             <a:avLst/>
           </a:prstGeom>
-        </p:spPr>
-      </p:pic>
-      <p:pic>
-        <p:nvPicPr>
-          <p:cNvPr id="7" name="Рисунок 6"/>
-          <p:cNvPicPr>
-            <a:picLocks noChangeAspect="1"/>
-          </p:cNvPicPr>
+          <a:noFill/>
+        </p:spPr>
+        <p:txBody>
+          <a:bodyPr wrap="square" rtlCol="0">
+            <a:spAutoFit/>
+          </a:bodyPr>
+          <a:lstStyle/>
+          <a:p>
+            <a:r>
+              <a:rPr lang="ru-RU" dirty="0"/>
+              <a:t>Шаг 5</a:t>
+            </a:r>
+          </a:p>
+        </p:txBody>
+      </p:sp>
+      <p:sp>
+        <p:nvSpPr>
+          <p:cNvPr id="14" name="TextBox 13">
+            <a:extLst>
+              <a:ext uri="{FF2B5EF4-FFF2-40B4-BE49-F238E27FC236}">
+                <a16:creationId xmlns:a16="http://schemas.microsoft.com/office/drawing/2014/main" id="{2FE6A293-7732-4B27-80E4-8E58DA0CEA7A}"/>
+              </a:ext>
+            </a:extLst>
+          </p:cNvPr>
+          <p:cNvSpPr txBox="1"/>
           <p:nvPr/>
-        </p:nvPicPr>
-        <p:blipFill>
-          <a:blip r:embed="rId4"/>
-          <a:stretch>
-            <a:fillRect/>
-          </a:stretch>
-        </p:blipFill>
-        <p:spPr>
-          <a:xfrm>
-            <a:off x="7500204" y="6211018"/>
-            <a:ext cx="628098" cy="335815"/>
+        </p:nvSpPr>
+        <p:spPr>
+          <a:xfrm>
+            <a:off x="6211455" y="2038349"/>
+            <a:ext cx="2124363" cy="369332"/>
           </a:xfrm>
           <a:prstGeom prst="rect">
             <a:avLst/>
           </a:prstGeom>
-        </p:spPr>
-      </p:pic>
-      <p:pic>
-        <p:nvPicPr>
-          <p:cNvPr id="8" name="Рисунок 7"/>
-          <p:cNvPicPr>
-            <a:picLocks noChangeAspect="1"/>
-          </p:cNvPicPr>
-          <p:nvPr/>
-        </p:nvPicPr>
-        <p:blipFill>
-          <a:blip r:embed="rId5"/>
-          <a:stretch>
-            <a:fillRect/>
-          </a:stretch>
-        </p:blipFill>
-        <p:spPr>
-          <a:xfrm>
-            <a:off x="8160199" y="1407706"/>
-            <a:ext cx="4031801" cy="5139127"/>
-          </a:xfrm>
-          <a:prstGeom prst="rect">
-            <a:avLst/>
-          </a:prstGeom>
-        </p:spPr>
-      </p:pic>
+          <a:noFill/>
+        </p:spPr>
+        <p:txBody>
+          <a:bodyPr wrap="square" rtlCol="0">
+            <a:spAutoFit/>
+          </a:bodyPr>
+          <a:lstStyle/>
+          <a:p>
+            <a:r>
+              <a:rPr lang="ru-RU" dirty="0"/>
+              <a:t>Шаг 6</a:t>
+            </a:r>
+          </a:p>
+        </p:txBody>
+      </p:sp>
     </p:spTree>
     <p:extLst>
       <p:ext uri="{BB962C8B-B14F-4D97-AF65-F5344CB8AC3E}">
@@ -4436,8 +4347,8 @@
         </p:nvSpPr>
         <p:spPr>
           <a:xfrm>
-            <a:off x="838200" y="296114"/>
-            <a:ext cx="10515600" cy="1325563"/>
+            <a:off x="0" y="0"/>
+            <a:ext cx="5966691" cy="886691"/>
           </a:xfrm>
         </p:spPr>
         <p:txBody>
@@ -4447,20 +4358,21 @@
           <a:lstStyle/>
           <a:p>
             <a:r>
-              <a:rPr lang="ru-RU" sz="3600" dirty="0"/>
-              <a:t>Б) Предложите пример синтаксически правильной цепочки для выбранной грамматике. Нужно построить синтаксическое дерево</a:t>
-            </a:r>
-            <a:r>
-              <a:rPr lang="ru-RU" sz="3600" dirty="0" smtClean="0"/>
-              <a:t>.</a:t>
-            </a:r>
-            <a:endParaRPr lang="ru-RU" sz="3600" dirty="0"/>
+              <a:rPr lang="ru-RU" sz="1800" dirty="0"/>
+              <a:t>Б) Предложите пример синтаксически правильной цепочки для выбранной грамматике. Нужно построить синтаксическое дерево.</a:t>
+            </a:r>
           </a:p>
         </p:txBody>
       </p:sp>
       <p:pic>
         <p:nvPicPr>
-          <p:cNvPr id="5" name="Рисунок 4"/>
+          <p:cNvPr id="3" name="Рисунок 2">
+            <a:extLst>
+              <a:ext uri="{FF2B5EF4-FFF2-40B4-BE49-F238E27FC236}">
+                <a16:creationId xmlns:a16="http://schemas.microsoft.com/office/drawing/2014/main" id="{8CC25FA0-8EA1-48B8-BCF6-C1AB462E68C5}"/>
+              </a:ext>
+            </a:extLst>
+          </p:cNvPr>
           <p:cNvPicPr>
             <a:picLocks noChangeAspect="1"/>
           </p:cNvPicPr>
@@ -4474,38 +4386,49 @@
         </p:blipFill>
         <p:spPr>
           <a:xfrm>
-            <a:off x="1373038" y="1837425"/>
-            <a:ext cx="3898960" cy="4933957"/>
+            <a:off x="5966691" y="0"/>
+            <a:ext cx="4420634" cy="6681924"/>
           </a:xfrm>
           <a:prstGeom prst="rect">
             <a:avLst/>
           </a:prstGeom>
         </p:spPr>
       </p:pic>
-      <p:pic>
-        <p:nvPicPr>
-          <p:cNvPr id="6" name="Рисунок 5"/>
-          <p:cNvPicPr>
-            <a:picLocks noChangeAspect="1"/>
-          </p:cNvPicPr>
+      <p:sp>
+        <p:nvSpPr>
+          <p:cNvPr id="7" name="TextBox 6">
+            <a:extLst>
+              <a:ext uri="{FF2B5EF4-FFF2-40B4-BE49-F238E27FC236}">
+                <a16:creationId xmlns:a16="http://schemas.microsoft.com/office/drawing/2014/main" id="{EC690314-F356-4404-8E76-FF37D739CDD6}"/>
+              </a:ext>
+            </a:extLst>
+          </p:cNvPr>
+          <p:cNvSpPr txBox="1"/>
           <p:nvPr/>
-        </p:nvPicPr>
-        <p:blipFill>
-          <a:blip r:embed="rId3"/>
-          <a:stretch>
-            <a:fillRect/>
-          </a:stretch>
-        </p:blipFill>
-        <p:spPr>
-          <a:xfrm>
-            <a:off x="6304292" y="1739916"/>
-            <a:ext cx="4099165" cy="5031466"/>
+        </p:nvSpPr>
+        <p:spPr>
+          <a:xfrm>
+            <a:off x="2983345" y="1133185"/>
+            <a:ext cx="2124363" cy="369332"/>
           </a:xfrm>
           <a:prstGeom prst="rect">
             <a:avLst/>
           </a:prstGeom>
-        </p:spPr>
-      </p:pic>
+          <a:noFill/>
+        </p:spPr>
+        <p:txBody>
+          <a:bodyPr wrap="square" rtlCol="0">
+            <a:spAutoFit/>
+          </a:bodyPr>
+          <a:lstStyle/>
+          <a:p>
+            <a:r>
+              <a:rPr lang="ru-RU" dirty="0"/>
+              <a:t>Шаг 7</a:t>
+            </a:r>
+          </a:p>
+        </p:txBody>
+      </p:sp>
     </p:spTree>
     <p:extLst>
       <p:ext uri="{BB962C8B-B14F-4D97-AF65-F5344CB8AC3E}">
@@ -4553,20 +4476,12 @@
           </a:bodyPr>
           <a:lstStyle/>
           <a:p>
-            <a:r>
-              <a:rPr lang="ru-RU" sz="2800" dirty="0" smtClean="0"/>
-              <a:t/>
-            </a:r>
             <a:br>
-              <a:rPr lang="ru-RU" sz="2800" dirty="0" smtClean="0"/>
+              <a:rPr lang="ru-RU" sz="2800" dirty="0"/>
             </a:br>
             <a:r>
-              <a:rPr lang="ru-RU" sz="2800" dirty="0" smtClean="0"/>
-              <a:t>В)Выполните </a:t>
-            </a:r>
-            <a:r>
               <a:rPr lang="ru-RU" sz="2800" dirty="0"/>
-              <a:t>разбор данной цепочки в соответствии с алгоритмом «сдвиг-свертка». Убедитесь, что в работе алгоритма появляется то же дерево, что было построено на шаге б).</a:t>
+              <a:t>В)Выполните разбор данной цепочки в соответствии с алгоритмом «сдвиг-свертка». Убедитесь, что в работе алгоритма появляется то же дерево, что было построено на шаге б).</a:t>
             </a:r>
             <a:br>
               <a:rPr lang="ru-RU" sz="2800" dirty="0"/>
@@ -4627,12 +4542,8 @@
               <a:buAutoNum type="arabicParenR"/>
             </a:pPr>
             <a:r>
-              <a:rPr lang="en-US" dirty="0" smtClean="0"/>
-              <a:t>Ꜫ //</a:t>
-            </a:r>
-            <a:r>
-              <a:rPr lang="ru-RU" dirty="0" smtClean="0"/>
-              <a:t> сдвиг</a:t>
+              <a:rPr lang="ru-RU" dirty="0"/>
+              <a:t>.</a:t>
             </a:r>
           </a:p>
           <a:p>
@@ -4640,8 +4551,8 @@
               <a:buAutoNum type="arabicParenR"/>
             </a:pPr>
             <a:r>
-              <a:rPr lang="ru-RU" dirty="0" smtClean="0"/>
-              <a:t>а // свёртка</a:t>
+              <a:rPr lang="ru-RU" dirty="0"/>
+              <a:t>.</a:t>
             </a:r>
           </a:p>
         </p:txBody>
@@ -4717,24 +4628,17 @@
           <a:lstStyle/>
           <a:p>
             <a:r>
-              <a:rPr lang="en-US" dirty="0" smtClean="0"/>
-              <a:t>3) A //</a:t>
-            </a:r>
-            <a:r>
-              <a:rPr lang="ru-RU" dirty="0" smtClean="0"/>
-              <a:t>сдвиг</a:t>
+              <a:rPr lang="en-US" dirty="0"/>
+              <a:t>3) </a:t>
             </a:r>
             <a:br>
-              <a:rPr lang="ru-RU" dirty="0" smtClean="0"/>
+              <a:rPr lang="ru-RU" dirty="0"/>
             </a:br>
             <a:r>
-              <a:rPr lang="en-US" dirty="0" smtClean="0"/>
-              <a:t>4) Ab //</a:t>
-            </a:r>
-            <a:r>
-              <a:rPr lang="ru-RU" dirty="0" smtClean="0"/>
-              <a:t> свёртка</a:t>
-            </a:r>
+              <a:rPr lang="en-US" dirty="0"/>
+              <a:t>4) </a:t>
+            </a:r>
+            <a:endParaRPr lang="ru-RU" dirty="0"/>
           </a:p>
         </p:txBody>
       </p:sp>
@@ -4785,31 +4689,26 @@
           <a:lstStyle/>
           <a:p>
             <a:r>
-              <a:rPr lang="ru-RU" dirty="0" smtClean="0"/>
+              <a:rPr lang="ru-RU" dirty="0"/>
               <a:t>5</a:t>
             </a:r>
             <a:r>
-              <a:rPr lang="en-US" dirty="0" smtClean="0"/>
-              <a:t>) A</a:t>
-            </a:r>
-            <a:r>
               <a:rPr lang="en-US" dirty="0"/>
-              <a:t>B</a:t>
-            </a:r>
-            <a:r>
-              <a:rPr lang="en-US" dirty="0" smtClean="0"/>
-              <a:t> // </a:t>
-            </a:r>
-            <a:r>
-              <a:rPr lang="ru-RU" dirty="0" smtClean="0"/>
-              <a:t>свёртка</a:t>
-            </a:r>
+              <a:t>)</a:t>
+            </a:r>
+            <a:endParaRPr lang="ru-RU" dirty="0"/>
           </a:p>
         </p:txBody>
       </p:sp>
       <p:pic>
         <p:nvPicPr>
-          <p:cNvPr id="19" name="Рисунок 18"/>
+          <p:cNvPr id="4" name="Рисунок 3">
+            <a:extLst>
+              <a:ext uri="{FF2B5EF4-FFF2-40B4-BE49-F238E27FC236}">
+                <a16:creationId xmlns:a16="http://schemas.microsoft.com/office/drawing/2014/main" id="{8C102991-D31B-4004-8AA8-69887B979C3A}"/>
+              </a:ext>
+            </a:extLst>
+          </p:cNvPr>
           <p:cNvPicPr>
             <a:picLocks noChangeAspect="1"/>
           </p:cNvPicPr>
@@ -4823,8 +4722,8 @@
         </p:blipFill>
         <p:spPr>
           <a:xfrm>
-            <a:off x="6812620" y="4645231"/>
-            <a:ext cx="3711516" cy="2159577"/>
+            <a:off x="7035455" y="4673576"/>
+            <a:ext cx="3263090" cy="2151800"/>
           </a:xfrm>
           <a:prstGeom prst="rect">
             <a:avLst/>
@@ -4883,20 +4782,12 @@
           </a:bodyPr>
           <a:lstStyle/>
           <a:p>
-            <a:r>
-              <a:rPr lang="ru-RU" sz="2800" dirty="0" smtClean="0"/>
-              <a:t/>
-            </a:r>
             <a:br>
-              <a:rPr lang="ru-RU" sz="2800" dirty="0" smtClean="0"/>
+              <a:rPr lang="ru-RU" sz="2800" dirty="0"/>
             </a:br>
             <a:r>
-              <a:rPr lang="ru-RU" sz="2800" dirty="0" smtClean="0"/>
-              <a:t>В)Выполните </a:t>
-            </a:r>
-            <a:r>
               <a:rPr lang="ru-RU" sz="2800" dirty="0"/>
-              <a:t>разбор данной цепочки в соответствии с алгоритмом «сдвиг-свертка». Убедитесь, что в работе алгоритма появляется то же дерево, что было построено на шаге б).</a:t>
+              <a:t>В)Выполните разбор данной цепочки в соответствии с алгоритмом «сдвиг-свертка». Убедитесь, что в работе алгоритма появляется то же дерево, что было построено на шаге б).</a:t>
             </a:r>
             <a:br>
               <a:rPr lang="ru-RU" sz="2800" dirty="0"/>
@@ -4932,27 +4823,56 @@
               <a:t>6</a:t>
             </a:r>
             <a:r>
-              <a:rPr lang="en-US" dirty="0" smtClean="0"/>
+              <a:rPr lang="en-US" dirty="0"/>
               <a:t>)  </a:t>
             </a:r>
-            <a:r>
-              <a:rPr lang="ru-RU" dirty="0" smtClean="0"/>
-              <a:t>А </a:t>
-            </a:r>
-            <a:r>
-              <a:rPr lang="en-US" dirty="0" smtClean="0"/>
-              <a:t>// </a:t>
-            </a:r>
-            <a:r>
-              <a:rPr lang="ru-RU" dirty="0" smtClean="0"/>
-              <a:t>сдвиг</a:t>
-            </a:r>
+            <a:endParaRPr lang="ru-RU" dirty="0"/>
+          </a:p>
+        </p:txBody>
+      </p:sp>
+      <p:sp>
+        <p:nvSpPr>
+          <p:cNvPr id="9" name="TextBox 8"/>
+          <p:cNvSpPr txBox="1"/>
+          <p:nvPr/>
+        </p:nvSpPr>
+        <p:spPr>
+          <a:xfrm>
+            <a:off x="6205268" y="1917005"/>
+            <a:ext cx="5555411" cy="369332"/>
+          </a:xfrm>
+          <a:prstGeom prst="rect">
+            <a:avLst/>
+          </a:prstGeom>
+          <a:noFill/>
+        </p:spPr>
+        <p:txBody>
+          <a:bodyPr wrap="square" rtlCol="0">
+            <a:spAutoFit/>
+          </a:bodyPr>
+          <a:lstStyle/>
+          <a:p>
+            <a:r>
+              <a:rPr lang="ru-RU" dirty="0"/>
+              <a:t>7</a:t>
+            </a:r>
+            <a:r>
+              <a:rPr lang="en-US" dirty="0"/>
+              <a:t>)  </a:t>
+            </a:r>
+            <a:endParaRPr lang="ru-RU" dirty="0"/>
           </a:p>
         </p:txBody>
       </p:sp>
       <p:pic>
         <p:nvPicPr>
-          <p:cNvPr id="8" name="Рисунок 7"/>
+          <p:cNvPr id="3" name="Рисунок 2">
+            <a:extLst>
+              <a:ext uri="{FF2B5EF4-FFF2-40B4-BE49-F238E27FC236}">
+                <a16:creationId xmlns:a16="http://schemas.microsoft.com/office/drawing/2014/main" id="{B9513FF0-5622-4E8A-BD3F-3772FBEA4872}"/>
+              </a:ext>
+            </a:extLst>
+          </p:cNvPr>
           <p:cNvPicPr>
             <a:picLocks noChangeAspect="1"/>
           </p:cNvPicPr>
@@ -4966,66 +4886,23 @@
         </p:blipFill>
         <p:spPr>
           <a:xfrm>
-            <a:off x="838200" y="2420938"/>
-            <a:ext cx="4307456" cy="3136131"/>
+            <a:off x="540589" y="2771342"/>
+            <a:ext cx="4343400" cy="2867025"/>
           </a:xfrm>
           <a:prstGeom prst="rect">
             <a:avLst/>
           </a:prstGeom>
         </p:spPr>
       </p:pic>
-      <p:sp>
-        <p:nvSpPr>
-          <p:cNvPr id="9" name="TextBox 8"/>
-          <p:cNvSpPr txBox="1"/>
-          <p:nvPr/>
-        </p:nvSpPr>
-        <p:spPr>
-          <a:xfrm>
-            <a:off x="6205268" y="1917005"/>
-            <a:ext cx="5555411" cy="369332"/>
-          </a:xfrm>
-          <a:prstGeom prst="rect">
-            <a:avLst/>
-          </a:prstGeom>
-          <a:noFill/>
-        </p:spPr>
-        <p:txBody>
-          <a:bodyPr wrap="square" rtlCol="0">
-            <a:spAutoFit/>
-          </a:bodyPr>
-          <a:lstStyle/>
-          <a:p>
-            <a:r>
-              <a:rPr lang="ru-RU" dirty="0" smtClean="0"/>
-              <a:t>7</a:t>
-            </a:r>
-            <a:r>
-              <a:rPr lang="en-US" dirty="0" smtClean="0"/>
-              <a:t>)  </a:t>
-            </a:r>
-            <a:r>
-              <a:rPr lang="ru-RU" dirty="0" err="1" smtClean="0"/>
-              <a:t>Аа</a:t>
-            </a:r>
-            <a:r>
-              <a:rPr lang="ru-RU" dirty="0" smtClean="0"/>
-              <a:t> </a:t>
-            </a:r>
-            <a:r>
-              <a:rPr lang="en-US" dirty="0" smtClean="0"/>
-              <a:t>// </a:t>
-            </a:r>
-            <a:r>
-              <a:rPr lang="ru-RU" dirty="0" smtClean="0"/>
-              <a:t>свёртка</a:t>
-            </a:r>
-          </a:p>
-        </p:txBody>
-      </p:sp>
       <p:pic>
         <p:nvPicPr>
-          <p:cNvPr id="10" name="Рисунок 9"/>
+          <p:cNvPr id="6" name="Рисунок 5">
+            <a:extLst>
+              <a:ext uri="{FF2B5EF4-FFF2-40B4-BE49-F238E27FC236}">
+                <a16:creationId xmlns:a16="http://schemas.microsoft.com/office/drawing/2014/main" id="{855151EB-CBFE-4BE6-8214-4A0FCF974931}"/>
+              </a:ext>
+            </a:extLst>
+          </p:cNvPr>
           <p:cNvPicPr>
             <a:picLocks noChangeAspect="1"/>
           </p:cNvPicPr>
@@ -5039,8 +4916,8 @@
         </p:blipFill>
         <p:spPr>
           <a:xfrm>
-            <a:off x="6654110" y="2420938"/>
-            <a:ext cx="4657725" cy="3257550"/>
+            <a:off x="6205268" y="2288646"/>
+            <a:ext cx="4486275" cy="4305300"/>
           </a:xfrm>
           <a:prstGeom prst="rect">
             <a:avLst/>
@@ -5087,7 +4964,7 @@
         </p:nvSpPr>
         <p:spPr>
           <a:xfrm>
-            <a:off x="838200" y="250107"/>
+            <a:off x="794066" y="-107379"/>
             <a:ext cx="10515600" cy="1325563"/>
           </a:xfrm>
           <a:prstGeom prst="rect">
@@ -5118,19 +4995,15 @@
             </a:lvl1pPr>
           </a:lstStyle>
           <a:p>
-            <a:r>
-              <a:rPr lang="ru-RU" sz="2800" dirty="0" smtClean="0"/>
-              <a:t/>
-            </a:r>
             <a:br>
-              <a:rPr lang="ru-RU" sz="2800" dirty="0" smtClean="0"/>
+              <a:rPr lang="ru-RU" sz="2800" dirty="0"/>
             </a:br>
             <a:r>
-              <a:rPr lang="ru-RU" sz="2800" dirty="0" smtClean="0"/>
+              <a:rPr lang="ru-RU" sz="2800" dirty="0"/>
               <a:t>В)Выполните разбор данной цепочки в соответствии с алгоритмом «сдвиг-свертка». Убедитесь, что в работе алгоритма появляется то же дерево, что было построено на шаге б).</a:t>
             </a:r>
             <a:br>
-              <a:rPr lang="ru-RU" sz="2800" dirty="0" smtClean="0"/>
+              <a:rPr lang="ru-RU" sz="2800" dirty="0"/>
             </a:br>
             <a:endParaRPr lang="ru-RU" sz="2800" dirty="0"/>
           </a:p>
@@ -5159,35 +5032,99 @@
           <a:lstStyle/>
           <a:p>
             <a:r>
-              <a:rPr lang="ru-RU" dirty="0" smtClean="0"/>
+              <a:rPr lang="ru-RU" dirty="0"/>
               <a:t>7</a:t>
             </a:r>
             <a:r>
-              <a:rPr lang="en-US" dirty="0" smtClean="0"/>
-              <a:t>)  </a:t>
-            </a:r>
-            <a:r>
-              <a:rPr lang="ru-RU" dirty="0" err="1" smtClean="0"/>
-              <a:t>АА</a:t>
-            </a:r>
-            <a:r>
-              <a:rPr lang="ru-RU" dirty="0" smtClean="0"/>
+              <a:rPr lang="en-US" dirty="0"/>
+              <a:t>) </a:t>
+            </a:r>
+            <a:endParaRPr lang="ru-RU" dirty="0"/>
+          </a:p>
+        </p:txBody>
+      </p:sp>
+      <p:sp>
+        <p:nvSpPr>
+          <p:cNvPr id="8" name="TextBox 7"/>
+          <p:cNvSpPr txBox="1"/>
+          <p:nvPr/>
+        </p:nvSpPr>
+        <p:spPr>
+          <a:xfrm>
+            <a:off x="5890753" y="1218184"/>
+            <a:ext cx="5555411" cy="769441"/>
+          </a:xfrm>
+          <a:prstGeom prst="rect">
+            <a:avLst/>
+          </a:prstGeom>
+          <a:noFill/>
+        </p:spPr>
+        <p:txBody>
+          <a:bodyPr wrap="square" rtlCol="0">
+            <a:spAutoFit/>
+          </a:bodyPr>
+          <a:lstStyle/>
+          <a:p>
+            <a:r>
+              <a:rPr lang="ru-RU" sz="1100" dirty="0"/>
+              <a:t>8</a:t>
+            </a:r>
+            <a:r>
+              <a:rPr lang="en-US" sz="1100" dirty="0"/>
+              <a:t>)</a:t>
+            </a:r>
+            <a:r>
+              <a:rPr lang="ru-RU" sz="1100" dirty="0"/>
+              <a:t> 10)</a:t>
+            </a:r>
+            <a:r>
+              <a:rPr lang="en-US" sz="1100" dirty="0"/>
+              <a:t>S</a:t>
+            </a:r>
+          </a:p>
+          <a:p>
+            <a:r>
+              <a:rPr lang="ru-RU" sz="1100" dirty="0"/>
+              <a:t>Алгоритм закончен, потому что мы пришли в </a:t>
+            </a:r>
+            <a:r>
+              <a:rPr lang="en-US" sz="1100" dirty="0"/>
+              <a:t>S </a:t>
+            </a:r>
+            <a:r>
+              <a:rPr lang="ru-RU" sz="1100" dirty="0"/>
+              <a:t>больше нечего сдвигать или </a:t>
+            </a:r>
+            <a:r>
+              <a:rPr lang="ru-RU" sz="1100" dirty="0" err="1"/>
+              <a:t>свертать</a:t>
+            </a:r>
+            <a:br>
+              <a:rPr lang="ru-RU" sz="1100" dirty="0"/>
+            </a:br>
+            <a:r>
+              <a:rPr lang="ru-RU" sz="1100" dirty="0"/>
+              <a:t>Вывод: Дерево построенное на шаге Б то же, что и построенное в ходе алгоритма.</a:t>
+            </a:r>
+          </a:p>
+          <a:p>
+            <a:r>
+              <a:rPr lang="en-US" sz="1100" dirty="0"/>
               <a:t> </a:t>
             </a:r>
-            <a:r>
-              <a:rPr lang="en-US" dirty="0" smtClean="0"/>
-              <a:t>// </a:t>
-            </a:r>
-            <a:r>
-              <a:rPr lang="ru-RU" dirty="0" smtClean="0"/>
-              <a:t>свёртка</a:t>
-            </a:r>
+            <a:endParaRPr lang="ru-RU" sz="1100" dirty="0"/>
           </a:p>
         </p:txBody>
       </p:sp>
       <p:pic>
         <p:nvPicPr>
-          <p:cNvPr id="7" name="Рисунок 6"/>
+          <p:cNvPr id="3" name="Рисунок 2">
+            <a:extLst>
+              <a:ext uri="{FF2B5EF4-FFF2-40B4-BE49-F238E27FC236}">
+                <a16:creationId xmlns:a16="http://schemas.microsoft.com/office/drawing/2014/main" id="{474E82DC-D6E3-4005-BD3B-F00972BDA155}"/>
+              </a:ext>
+            </a:extLst>
+          </p:cNvPr>
           <p:cNvPicPr>
             <a:picLocks noChangeAspect="1"/>
           </p:cNvPicPr>
@@ -5201,62 +5138,23 @@
         </p:blipFill>
         <p:spPr>
           <a:xfrm>
-            <a:off x="838200" y="2144594"/>
-            <a:ext cx="4629150" cy="4314825"/>
+            <a:off x="505980" y="2086465"/>
+            <a:ext cx="4400550" cy="4400550"/>
           </a:xfrm>
           <a:prstGeom prst="rect">
             <a:avLst/>
           </a:prstGeom>
         </p:spPr>
       </p:pic>
-      <p:sp>
-        <p:nvSpPr>
-          <p:cNvPr id="8" name="TextBox 7"/>
-          <p:cNvSpPr txBox="1"/>
-          <p:nvPr/>
-        </p:nvSpPr>
-        <p:spPr>
-          <a:xfrm>
-            <a:off x="6313098" y="1663817"/>
-            <a:ext cx="5555411" cy="369332"/>
-          </a:xfrm>
-          <a:prstGeom prst="rect">
-            <a:avLst/>
-          </a:prstGeom>
-          <a:noFill/>
-        </p:spPr>
-        <p:txBody>
-          <a:bodyPr wrap="square" rtlCol="0">
-            <a:spAutoFit/>
-          </a:bodyPr>
-          <a:lstStyle/>
-          <a:p>
-            <a:r>
-              <a:rPr lang="ru-RU" dirty="0"/>
-              <a:t>8</a:t>
-            </a:r>
-            <a:r>
-              <a:rPr lang="en-US" dirty="0" smtClean="0"/>
-              <a:t>)  </a:t>
-            </a:r>
-            <a:r>
-              <a:rPr lang="ru-RU" dirty="0" smtClean="0"/>
-              <a:t>А </a:t>
-            </a:r>
-            <a:r>
-              <a:rPr lang="en-US" dirty="0" smtClean="0"/>
-              <a:t>// </a:t>
-            </a:r>
-            <a:r>
-              <a:rPr lang="ru-RU" dirty="0" smtClean="0"/>
-              <a:t>сдвиг</a:t>
-            </a:r>
-          </a:p>
-        </p:txBody>
-      </p:sp>
       <p:pic>
         <p:nvPicPr>
-          <p:cNvPr id="9" name="Рисунок 8"/>
+          <p:cNvPr id="10" name="Рисунок 9">
+            <a:extLst>
+              <a:ext uri="{FF2B5EF4-FFF2-40B4-BE49-F238E27FC236}">
+                <a16:creationId xmlns:a16="http://schemas.microsoft.com/office/drawing/2014/main" id="{B5094378-C620-4027-AEAF-B6BF2E78B637}"/>
+              </a:ext>
+            </a:extLst>
+          </p:cNvPr>
           <p:cNvPicPr>
             <a:picLocks noChangeAspect="1"/>
           </p:cNvPicPr>
@@ -5270,8 +5168,8 @@
         </p:blipFill>
         <p:spPr>
           <a:xfrm>
-            <a:off x="7170931" y="2144594"/>
-            <a:ext cx="3839744" cy="4553393"/>
+            <a:off x="7566630" y="2086465"/>
+            <a:ext cx="4052716" cy="4650232"/>
           </a:xfrm>
           <a:prstGeom prst="rect">
             <a:avLst/>

</xml_diff>